<commit_message>
minor fix to error messages ppt
</commit_message>
<xml_diff>
--- a/design-docs/Improving Error Messages.pptx
+++ b/design-docs/Improving Error Messages.pptx
@@ -4779,87 +4779,115 @@
         <p:spPr/>
         <p:txBody>
           <a:bodyPr>
-            <a:normAutofit/>
+            <a:normAutofit lnSpcReduction="10000"/>
           </a:bodyPr>
           <a:lstStyle/>
           <a:p>
             <a:r>
-              <a:rPr lang="en-US" i="1" dirty="0">
+              <a:rPr lang="en-US" sz="2800" i="1" dirty="0">
                 <a:hlinkClick r:id="rId2"/>
               </a:rPr>
               <a:t>Measuring the Effectiveness of Error Messages Designed for Novice Programmers</a:t>
             </a:r>
             <a:r>
-              <a:rPr lang="en-US" dirty="0"/>
+              <a:rPr lang="en-US" sz="2800" dirty="0"/>
               <a:t>. Guillaume Marceau, Kathi Fisler, </a:t>
             </a:r>
             <a:r>
-              <a:rPr lang="en-US" dirty="0" err="1"/>
+              <a:rPr lang="en-US" sz="2800" dirty="0" err="1"/>
               <a:t>Shriram</a:t>
             </a:r>
             <a:r>
-              <a:rPr lang="en-US" dirty="0"/>
+              <a:rPr lang="en-US" sz="2800" dirty="0"/>
               <a:t> </a:t>
             </a:r>
             <a:r>
-              <a:rPr lang="en-US" dirty="0" err="1"/>
+              <a:rPr lang="en-US" sz="2800" dirty="0" err="1"/>
               <a:t>Krishnamurthi</a:t>
             </a:r>
             <a:r>
-              <a:rPr lang="en-US" dirty="0"/>
+              <a:rPr lang="en-US" sz="2800" dirty="0"/>
               <a:t>. </a:t>
             </a:r>
             <a:r>
-              <a:rPr lang="en-US" dirty="0" smtClean="0"/>
+              <a:rPr lang="en-US" sz="2800" dirty="0" smtClean="0"/>
               <a:t>ACM </a:t>
             </a:r>
             <a:r>
-              <a:rPr lang="en-US" dirty="0"/>
+              <a:rPr lang="en-US" sz="2800" dirty="0"/>
               <a:t>SIGCSE </a:t>
             </a:r>
             <a:r>
-              <a:rPr lang="en-US" dirty="0" smtClean="0"/>
+              <a:rPr lang="en-US" sz="2800" dirty="0" smtClean="0"/>
               <a:t>2011</a:t>
             </a:r>
           </a:p>
           <a:p>
-            <a:r>
-              <a:rPr lang="en-US" i="1" dirty="0" smtClean="0">
+            <a:endParaRPr lang="en-US" sz="2800" dirty="0" smtClean="0"/>
+          </a:p>
+          <a:p>
+            <a:r>
+              <a:rPr lang="en-US" sz="2800" i="1" dirty="0" smtClean="0">
                 <a:hlinkClick r:id="rId3"/>
               </a:rPr>
               <a:t>Mind </a:t>
             </a:r>
             <a:r>
-              <a:rPr lang="en-US" i="1" dirty="0">
+              <a:rPr lang="en-US" sz="2800" i="1" dirty="0">
                 <a:hlinkClick r:id="rId3"/>
               </a:rPr>
               <a:t>Your Language: On Novices' Interactions with Error Messages</a:t>
             </a:r>
             <a:r>
-              <a:rPr lang="en-US" dirty="0"/>
+              <a:rPr lang="en-US" sz="2800" dirty="0"/>
               <a:t>. Guillaume Marceau, Kathi Fisler, and </a:t>
             </a:r>
             <a:r>
-              <a:rPr lang="en-US" dirty="0" err="1"/>
+              <a:rPr lang="en-US" sz="2800" dirty="0" err="1"/>
               <a:t>Shriram</a:t>
             </a:r>
             <a:r>
-              <a:rPr lang="en-US" dirty="0"/>
+              <a:rPr lang="en-US" sz="2800" dirty="0"/>
               <a:t> </a:t>
             </a:r>
             <a:r>
-              <a:rPr lang="en-US" dirty="0" err="1"/>
+              <a:rPr lang="en-US" sz="2800" dirty="0" err="1"/>
               <a:t>Krishnamurthi</a:t>
             </a:r>
             <a:r>
-              <a:rPr lang="en-US" dirty="0"/>
+              <a:rPr lang="en-US" sz="2800" dirty="0"/>
               <a:t>. OOPSLA Onward </a:t>
             </a:r>
             <a:r>
-              <a:rPr lang="en-US" dirty="0" smtClean="0"/>
+              <a:rPr lang="en-US" sz="2800" dirty="0" smtClean="0"/>
               <a:t>2011</a:t>
             </a:r>
-            <a:endParaRPr lang="en-US" dirty="0"/>
+          </a:p>
+          <a:p>
+            <a:endParaRPr lang="en-US" sz="2800" dirty="0"/>
+          </a:p>
+          <a:p>
+            <a:r>
+              <a:rPr lang="en-US" sz="2800" dirty="0" smtClean="0"/>
+              <a:t>Design specification in </a:t>
+            </a:r>
+            <a:r>
+              <a:rPr lang="en-US" sz="2800" dirty="0" err="1" smtClean="0"/>
+              <a:t>GitHub</a:t>
+            </a:r>
+            <a:r>
+              <a:rPr lang="en-US" sz="2800" dirty="0" smtClean="0"/>
+              <a:t>/</a:t>
+            </a:r>
+            <a:r>
+              <a:rPr lang="en-US" sz="2800" dirty="0" err="1" smtClean="0"/>
+              <a:t>designdocs</a:t>
+            </a:r>
+            <a:r>
+              <a:rPr lang="en-US" sz="2800" dirty="0" smtClean="0"/>
+              <a:t>/errors</a:t>
+            </a:r>
+            <a:endParaRPr lang="en-US" sz="2800" dirty="0"/>
           </a:p>
         </p:txBody>
       </p:sp>
@@ -4873,6 +4901,13 @@
   <p:clrMapOvr>
     <a:masterClrMapping/>
   </p:clrMapOvr>
+  <p:timing>
+    <p:tnLst>
+      <p:par>
+        <p:cTn id="1" dur="indefinite" restart="never" nodeType="tmRoot"/>
+      </p:par>
+    </p:tnLst>
+  </p:timing>
 </p:sld>
 </file>
 

</xml_diff>